<commit_message>
ISIS-1243: updating RO documentation
</commit_message>
<xml_diff>
--- a/adocs/documentation/src/main/asciidoc/guides/images/reference-services-spi/RepresentationService/service-collaborations.pptx
+++ b/adocs/documentation/src/main/asciidoc/guides/images/reference-services-spi/RepresentationService/service-collaborations.pptx
@@ -104,6 +104,22 @@
       </a:defRPr>
     </a:lvl9pPr>
   </p:defaultTextStyle>
+  <p:extLst>
+    <p:ext uri="{EFAFB233-063F-42B5-8137-9DF3F51BA10A}">
+      <p15:sldGuideLst xmlns:p15="http://schemas.microsoft.com/office/powerpoint/2012/main">
+        <p15:guide id="1" orient="horz" pos="2160">
+          <p15:clr>
+            <a:srgbClr val="A4A3A4"/>
+          </p15:clr>
+        </p15:guide>
+        <p15:guide id="2" pos="2880">
+          <p15:clr>
+            <a:srgbClr val="A4A3A4"/>
+          </p15:clr>
+        </p15:guide>
+      </p15:sldGuideLst>
+    </p:ext>
+  </p:extLst>
 </p:presentation>
 </file>
 
@@ -288,7 +304,7 @@
           <a:p>
             <a:fld id="{38DB0EA0-7D8C-4248-8B14-1A6C63AE0EB7}" type="datetimeFigureOut">
               <a:rPr lang="en-GB" smtClean="0"/>
-              <a:t>12/06/2015</a:t>
+              <a:t>04/12/2015</a:t>
             </a:fld>
             <a:endParaRPr lang="en-GB"/>
           </a:p>
@@ -458,7 +474,7 @@
           <a:p>
             <a:fld id="{38DB0EA0-7D8C-4248-8B14-1A6C63AE0EB7}" type="datetimeFigureOut">
               <a:rPr lang="en-GB" smtClean="0"/>
-              <a:t>12/06/2015</a:t>
+              <a:t>04/12/2015</a:t>
             </a:fld>
             <a:endParaRPr lang="en-GB"/>
           </a:p>
@@ -638,7 +654,7 @@
           <a:p>
             <a:fld id="{38DB0EA0-7D8C-4248-8B14-1A6C63AE0EB7}" type="datetimeFigureOut">
               <a:rPr lang="en-GB" smtClean="0"/>
-              <a:t>12/06/2015</a:t>
+              <a:t>04/12/2015</a:t>
             </a:fld>
             <a:endParaRPr lang="en-GB"/>
           </a:p>
@@ -808,7 +824,7 @@
           <a:p>
             <a:fld id="{38DB0EA0-7D8C-4248-8B14-1A6C63AE0EB7}" type="datetimeFigureOut">
               <a:rPr lang="en-GB" smtClean="0"/>
-              <a:t>12/06/2015</a:t>
+              <a:t>04/12/2015</a:t>
             </a:fld>
             <a:endParaRPr lang="en-GB"/>
           </a:p>
@@ -1054,7 +1070,7 @@
           <a:p>
             <a:fld id="{38DB0EA0-7D8C-4248-8B14-1A6C63AE0EB7}" type="datetimeFigureOut">
               <a:rPr lang="en-GB" smtClean="0"/>
-              <a:t>12/06/2015</a:t>
+              <a:t>04/12/2015</a:t>
             </a:fld>
             <a:endParaRPr lang="en-GB"/>
           </a:p>
@@ -1342,7 +1358,7 @@
           <a:p>
             <a:fld id="{38DB0EA0-7D8C-4248-8B14-1A6C63AE0EB7}" type="datetimeFigureOut">
               <a:rPr lang="en-GB" smtClean="0"/>
-              <a:t>12/06/2015</a:t>
+              <a:t>04/12/2015</a:t>
             </a:fld>
             <a:endParaRPr lang="en-GB"/>
           </a:p>
@@ -1764,7 +1780,7 @@
           <a:p>
             <a:fld id="{38DB0EA0-7D8C-4248-8B14-1A6C63AE0EB7}" type="datetimeFigureOut">
               <a:rPr lang="en-GB" smtClean="0"/>
-              <a:t>12/06/2015</a:t>
+              <a:t>04/12/2015</a:t>
             </a:fld>
             <a:endParaRPr lang="en-GB"/>
           </a:p>
@@ -1882,7 +1898,7 @@
           <a:p>
             <a:fld id="{38DB0EA0-7D8C-4248-8B14-1A6C63AE0EB7}" type="datetimeFigureOut">
               <a:rPr lang="en-GB" smtClean="0"/>
-              <a:t>12/06/2015</a:t>
+              <a:t>04/12/2015</a:t>
             </a:fld>
             <a:endParaRPr lang="en-GB"/>
           </a:p>
@@ -1977,7 +1993,7 @@
           <a:p>
             <a:fld id="{38DB0EA0-7D8C-4248-8B14-1A6C63AE0EB7}" type="datetimeFigureOut">
               <a:rPr lang="en-GB" smtClean="0"/>
-              <a:t>12/06/2015</a:t>
+              <a:t>04/12/2015</a:t>
             </a:fld>
             <a:endParaRPr lang="en-GB"/>
           </a:p>
@@ -2254,7 +2270,7 @@
           <a:p>
             <a:fld id="{38DB0EA0-7D8C-4248-8B14-1A6C63AE0EB7}" type="datetimeFigureOut">
               <a:rPr lang="en-GB" smtClean="0"/>
-              <a:t>12/06/2015</a:t>
+              <a:t>04/12/2015</a:t>
             </a:fld>
             <a:endParaRPr lang="en-GB"/>
           </a:p>
@@ -2507,7 +2523,7 @@
           <a:p>
             <a:fld id="{38DB0EA0-7D8C-4248-8B14-1A6C63AE0EB7}" type="datetimeFigureOut">
               <a:rPr lang="en-GB" smtClean="0"/>
-              <a:t>12/06/2015</a:t>
+              <a:t>04/12/2015</a:t>
             </a:fld>
             <a:endParaRPr lang="en-GB"/>
           </a:p>
@@ -2720,7 +2736,7 @@
           <a:p>
             <a:fld id="{38DB0EA0-7D8C-4248-8B14-1A6C63AE0EB7}" type="datetimeFigureOut">
               <a:rPr lang="en-GB" smtClean="0"/>
-              <a:t>12/06/2015</a:t>
+              <a:t>04/12/2015</a:t>
             </a:fld>
             <a:endParaRPr lang="en-GB"/>
           </a:p>
@@ -3152,7 +3168,7 @@
         </p:nvSpPr>
         <p:spPr>
           <a:xfrm>
-            <a:off x="251520" y="1844824"/>
+            <a:off x="251520" y="1628800"/>
             <a:ext cx="2088232" cy="914400"/>
           </a:xfrm>
           <a:prstGeom prst="rect">
@@ -3196,7 +3212,7 @@
             <a:pPr algn="ctr"/>
             <a:r>
               <a:rPr lang="en-GB" sz="1600" dirty="0" err="1" smtClean="0"/>
-              <a:t>ForRestfulObjects</a:t>
+              <a:t>ContentNegotiator</a:t>
             </a:r>
             <a:endParaRPr lang="en-GB" sz="1600" dirty="0"/>
           </a:p>
@@ -3214,7 +3230,7 @@
         <p:spPr>
           <a:xfrm flipV="1">
             <a:off x="1295636" y="1175048"/>
-            <a:ext cx="0" cy="669776"/>
+            <a:ext cx="0" cy="453752"/>
           </a:xfrm>
           <a:prstGeom prst="straightConnector1">
             <a:avLst/>
@@ -3247,7 +3263,7 @@
         </p:nvSpPr>
         <p:spPr>
           <a:xfrm>
-            <a:off x="3419872" y="1844824"/>
+            <a:off x="3707904" y="1628800"/>
             <a:ext cx="2088232" cy="914400"/>
           </a:xfrm>
           <a:prstGeom prst="rect">
@@ -3297,7 +3313,7 @@
         </p:nvSpPr>
         <p:spPr>
           <a:xfrm>
-            <a:off x="3440459" y="3429000"/>
+            <a:off x="3711713" y="3831431"/>
             <a:ext cx="2088232" cy="914400"/>
           </a:xfrm>
           <a:prstGeom prst="rect">
@@ -3359,8 +3375,8 @@
         </p:nvCxnSpPr>
         <p:spPr>
           <a:xfrm flipH="1" flipV="1">
-            <a:off x="4463988" y="2759224"/>
-            <a:ext cx="20587" cy="669776"/>
+            <a:off x="4752020" y="2543200"/>
+            <a:ext cx="3809" cy="1288231"/>
           </a:xfrm>
           <a:prstGeom prst="straightConnector1">
             <a:avLst/>
@@ -3393,7 +3409,7 @@
         </p:nvSpPr>
         <p:spPr>
           <a:xfrm>
-            <a:off x="6660232" y="3429000"/>
+            <a:off x="3726852" y="5826968"/>
             <a:ext cx="2088232" cy="914400"/>
           </a:xfrm>
           <a:prstGeom prst="rect">
@@ -3446,8 +3462,8 @@
         </p:nvCxnSpPr>
         <p:spPr>
           <a:xfrm>
-            <a:off x="2339752" y="2302024"/>
-            <a:ext cx="1080120" cy="0"/>
+            <a:off x="2339752" y="2086000"/>
+            <a:ext cx="1368152" cy="0"/>
           </a:xfrm>
           <a:prstGeom prst="straightConnector1">
             <a:avLst/>
@@ -3476,15 +3492,15 @@
         <p:nvCxnSpPr>
           <p:cNvPr id="19" name="Straight Arrow Connector 18"/>
           <p:cNvCxnSpPr>
-            <a:stCxn id="10" idx="3"/>
-            <a:endCxn id="14" idx="1"/>
+            <a:stCxn id="10" idx="2"/>
+            <a:endCxn id="14" idx="0"/>
           </p:cNvCxnSpPr>
           <p:nvPr/>
         </p:nvCxnSpPr>
         <p:spPr>
           <a:xfrm>
-            <a:off x="5528691" y="3886200"/>
-            <a:ext cx="1131541" cy="0"/>
+            <a:off x="4755829" y="4745831"/>
+            <a:ext cx="15139" cy="1081137"/>
           </a:xfrm>
           <a:prstGeom prst="straightConnector1">
             <a:avLst/>
@@ -3547,8 +3563,8 @@
         </p:nvSpPr>
         <p:spPr>
           <a:xfrm>
-            <a:off x="2706152" y="2319263"/>
-            <a:ext cx="785728" cy="461665"/>
+            <a:off x="1957875" y="2103239"/>
+            <a:ext cx="1822037" cy="830997"/>
           </a:xfrm>
           <a:prstGeom prst="rect">
             <a:avLst/>
@@ -3564,14 +3580,28 @@
             <a:pPr algn="r"/>
             <a:r>
               <a:rPr lang="en-GB" sz="1200" i="1" dirty="0" smtClean="0"/>
-              <a:t>delegates</a:t>
+              <a:t>delegates to</a:t>
             </a:r>
             <a:br>
               <a:rPr lang="en-GB" sz="1200" i="1" dirty="0" smtClean="0"/>
             </a:br>
             <a:r>
               <a:rPr lang="en-GB" sz="1200" i="1" dirty="0" smtClean="0"/>
-              <a:t>to</a:t>
+              <a:t>appropriate</a:t>
+            </a:r>
+            <a:br>
+              <a:rPr lang="en-GB" sz="1200" i="1" dirty="0" smtClean="0"/>
+            </a:br>
+            <a:r>
+              <a:rPr lang="en-GB" sz="1200" i="1" dirty="0" smtClean="0"/>
+              <a:t>implementation</a:t>
+            </a:r>
+            <a:br>
+              <a:rPr lang="en-GB" sz="1200" i="1" dirty="0" smtClean="0"/>
+            </a:br>
+            <a:r>
+              <a:rPr lang="en-GB" sz="1200" i="1" dirty="0" smtClean="0"/>
+              <a:t>(based on ACCEPT header)</a:t>
             </a:r>
             <a:endParaRPr lang="en-GB" sz="1200" i="1" dirty="0"/>
           </a:p>
@@ -3585,8 +3615,8 @@
         </p:nvSpPr>
         <p:spPr>
           <a:xfrm>
-            <a:off x="5874504" y="3903439"/>
-            <a:ext cx="785728" cy="461665"/>
+            <a:off x="2802019" y="5086925"/>
+            <a:ext cx="1907637" cy="646331"/>
           </a:xfrm>
           <a:prstGeom prst="rect">
             <a:avLst/>
@@ -3602,14 +3632,29 @@
             <a:pPr algn="r"/>
             <a:r>
               <a:rPr lang="en-GB" sz="1200" i="1" dirty="0" smtClean="0"/>
-              <a:t>delegates</a:t>
+              <a:t>delegates to </a:t>
+            </a:r>
+          </a:p>
+          <a:p>
+            <a:pPr algn="r"/>
+            <a:r>
+              <a:rPr lang="en-GB" sz="1200" i="1" dirty="0" smtClean="0"/>
+              <a:t>(if available, and recognizes</a:t>
             </a:r>
             <a:br>
               <a:rPr lang="en-GB" sz="1200" i="1" dirty="0" smtClean="0"/>
             </a:br>
             <a:r>
               <a:rPr lang="en-GB" sz="1200" i="1" dirty="0" smtClean="0"/>
-              <a:t>to</a:t>
+              <a:t>the x-</a:t>
+            </a:r>
+            <a:r>
+              <a:rPr lang="en-GB" sz="1200" i="1" dirty="0" err="1" smtClean="0"/>
+              <a:t>ro</a:t>
+            </a:r>
+            <a:r>
+              <a:rPr lang="en-GB" sz="1200" i="1" dirty="0" smtClean="0"/>
+              <a:t>-domain-type)</a:t>
             </a:r>
             <a:endParaRPr lang="en-GB" sz="1200" i="1" dirty="0"/>
           </a:p>
@@ -3623,7 +3668,7 @@
         </p:nvSpPr>
         <p:spPr>
           <a:xfrm>
-            <a:off x="4509047" y="2791961"/>
+            <a:off x="4797079" y="2575937"/>
             <a:ext cx="927049" cy="276999"/>
           </a:xfrm>
           <a:prstGeom prst="rect">
@@ -3640,6 +3685,358 @@
             <a:r>
               <a:rPr lang="en-GB" sz="1200" i="1" dirty="0" smtClean="0"/>
               <a:t>implements</a:t>
+            </a:r>
+            <a:endParaRPr lang="en-GB" sz="1200" i="1" dirty="0"/>
+          </a:p>
+        </p:txBody>
+      </p:sp>
+      <p:sp>
+        <p:nvSpPr>
+          <p:cNvPr id="16" name="Rectangle 15"/>
+          <p:cNvSpPr/>
+          <p:nvPr/>
+        </p:nvSpPr>
+        <p:spPr>
+          <a:xfrm>
+            <a:off x="6804248" y="3831431"/>
+            <a:ext cx="2088232" cy="914400"/>
+          </a:xfrm>
+          <a:prstGeom prst="rect">
+            <a:avLst/>
+          </a:prstGeom>
+        </p:spPr>
+        <p:style>
+          <a:lnRef idx="2">
+            <a:schemeClr val="accent3">
+              <a:shade val="50000"/>
+            </a:schemeClr>
+          </a:lnRef>
+          <a:fillRef idx="1">
+            <a:schemeClr val="accent3"/>
+          </a:fillRef>
+          <a:effectRef idx="0">
+            <a:schemeClr val="accent3"/>
+          </a:effectRef>
+          <a:fontRef idx="minor">
+            <a:schemeClr val="lt1"/>
+          </a:fontRef>
+        </p:style>
+        <p:txBody>
+          <a:bodyPr rtlCol="0" anchor="ctr"/>
+          <a:lstStyle/>
+          <a:p>
+            <a:pPr algn="ctr"/>
+            <a:r>
+              <a:rPr lang="en-GB" sz="1600" dirty="0" err="1" smtClean="0"/>
+              <a:t>ContentNegotiation</a:t>
+            </a:r>
+            <a:endParaRPr lang="en-GB" sz="1600" dirty="0" smtClean="0"/>
+          </a:p>
+          <a:p>
+            <a:pPr algn="ctr"/>
+            <a:r>
+              <a:rPr lang="en-GB" sz="1600" dirty="0" smtClean="0"/>
+              <a:t>Service</a:t>
+            </a:r>
+          </a:p>
+          <a:p>
+            <a:pPr algn="ctr"/>
+            <a:r>
+              <a:rPr lang="en-GB" sz="1600" dirty="0" smtClean="0"/>
+              <a:t>ForRestfulObjectsV1_0</a:t>
+            </a:r>
+            <a:endParaRPr lang="en-GB" sz="1600" dirty="0"/>
+          </a:p>
+        </p:txBody>
+      </p:sp>
+      <p:sp>
+        <p:nvSpPr>
+          <p:cNvPr id="17" name="Rectangle 16"/>
+          <p:cNvSpPr/>
+          <p:nvPr/>
+        </p:nvSpPr>
+        <p:spPr>
+          <a:xfrm>
+            <a:off x="662103" y="3831431"/>
+            <a:ext cx="2088232" cy="914400"/>
+          </a:xfrm>
+          <a:prstGeom prst="rect">
+            <a:avLst/>
+          </a:prstGeom>
+        </p:spPr>
+        <p:style>
+          <a:lnRef idx="2">
+            <a:schemeClr val="accent3">
+              <a:shade val="50000"/>
+            </a:schemeClr>
+          </a:lnRef>
+          <a:fillRef idx="1">
+            <a:schemeClr val="accent3"/>
+          </a:fillRef>
+          <a:effectRef idx="0">
+            <a:schemeClr val="accent3"/>
+          </a:effectRef>
+          <a:fontRef idx="minor">
+            <a:schemeClr val="lt1"/>
+          </a:fontRef>
+        </p:style>
+        <p:txBody>
+          <a:bodyPr rtlCol="0" anchor="ctr"/>
+          <a:lstStyle/>
+          <a:p>
+            <a:pPr algn="ctr"/>
+            <a:r>
+              <a:rPr lang="en-GB" sz="1600" dirty="0" err="1" smtClean="0"/>
+              <a:t>ContentNegotiation</a:t>
+            </a:r>
+            <a:endParaRPr lang="en-GB" sz="1600" dirty="0" smtClean="0"/>
+          </a:p>
+          <a:p>
+            <a:pPr algn="ctr"/>
+            <a:r>
+              <a:rPr lang="en-GB" sz="1600" dirty="0" smtClean="0"/>
+              <a:t>Service</a:t>
+            </a:r>
+          </a:p>
+          <a:p>
+            <a:pPr algn="ctr"/>
+            <a:r>
+              <a:rPr lang="en-GB" sz="1600" dirty="0" smtClean="0"/>
+              <a:t>Simplified</a:t>
+            </a:r>
+            <a:endParaRPr lang="en-GB" sz="1600" dirty="0"/>
+          </a:p>
+        </p:txBody>
+      </p:sp>
+      <p:cxnSp>
+        <p:nvCxnSpPr>
+          <p:cNvPr id="12" name="Elbow Connector 11"/>
+          <p:cNvCxnSpPr>
+            <a:stCxn id="17" idx="0"/>
+            <a:endCxn id="9" idx="2"/>
+          </p:cNvCxnSpPr>
+          <p:nvPr/>
+        </p:nvCxnSpPr>
+        <p:spPr>
+          <a:xfrm rot="5400000" flipH="1" flipV="1">
+            <a:off x="2585004" y="1664416"/>
+            <a:ext cx="1288231" cy="3045801"/>
+          </a:xfrm>
+          <a:prstGeom prst="bentConnector3">
+            <a:avLst>
+              <a:gd name="adj1" fmla="val 50000"/>
+            </a:avLst>
+          </a:prstGeom>
+          <a:ln w="25400">
+            <a:prstDash val="dash"/>
+            <a:tailEnd type="triangle" w="lg" len="lg"/>
+          </a:ln>
+        </p:spPr>
+        <p:style>
+          <a:lnRef idx="1">
+            <a:schemeClr val="accent1"/>
+          </a:lnRef>
+          <a:fillRef idx="0">
+            <a:schemeClr val="accent1"/>
+          </a:fillRef>
+          <a:effectRef idx="0">
+            <a:schemeClr val="accent1"/>
+          </a:effectRef>
+          <a:fontRef idx="minor">
+            <a:schemeClr val="tx1"/>
+          </a:fontRef>
+        </p:style>
+      </p:cxnSp>
+      <p:cxnSp>
+        <p:nvCxnSpPr>
+          <p:cNvPr id="27" name="Elbow Connector 26"/>
+          <p:cNvCxnSpPr>
+            <a:stCxn id="16" idx="0"/>
+            <a:endCxn id="9" idx="2"/>
+          </p:cNvCxnSpPr>
+          <p:nvPr/>
+        </p:nvCxnSpPr>
+        <p:spPr>
+          <a:xfrm rot="16200000" flipV="1">
+            <a:off x="5656077" y="1639144"/>
+            <a:ext cx="1288231" cy="3096344"/>
+          </a:xfrm>
+          <a:prstGeom prst="bentConnector3">
+            <a:avLst>
+              <a:gd name="adj1" fmla="val 50000"/>
+            </a:avLst>
+          </a:prstGeom>
+          <a:ln w="25400">
+            <a:prstDash val="dash"/>
+            <a:tailEnd type="triangle" w="lg" len="lg"/>
+          </a:ln>
+        </p:spPr>
+        <p:style>
+          <a:lnRef idx="1">
+            <a:schemeClr val="accent1"/>
+          </a:lnRef>
+          <a:fillRef idx="0">
+            <a:schemeClr val="accent1"/>
+          </a:fillRef>
+          <a:effectRef idx="0">
+            <a:schemeClr val="accent1"/>
+          </a:effectRef>
+          <a:fontRef idx="minor">
+            <a:schemeClr val="tx1"/>
+          </a:fontRef>
+        </p:style>
+      </p:cxnSp>
+      <p:sp>
+        <p:nvSpPr>
+          <p:cNvPr id="28" name="TextBox 27"/>
+          <p:cNvSpPr txBox="1"/>
+          <p:nvPr/>
+        </p:nvSpPr>
+        <p:spPr>
+          <a:xfrm>
+            <a:off x="3653335" y="3327375"/>
+            <a:ext cx="2713243" cy="276999"/>
+          </a:xfrm>
+          <a:prstGeom prst="rect">
+            <a:avLst/>
+          </a:prstGeom>
+          <a:noFill/>
+        </p:spPr>
+        <p:txBody>
+          <a:bodyPr wrap="none" rtlCol="0">
+            <a:spAutoFit/>
+          </a:bodyPr>
+          <a:lstStyle/>
+          <a:p>
+            <a:r>
+              <a:rPr lang="en-GB" sz="1200" i="1" dirty="0" smtClean="0"/>
+              <a:t>application/</a:t>
+            </a:r>
+            <a:r>
+              <a:rPr lang="en-GB" sz="1200" i="1" dirty="0" err="1" smtClean="0"/>
+              <a:t>json;x-ro-domain-type</a:t>
+            </a:r>
+            <a:r>
+              <a:rPr lang="en-GB" sz="1200" i="1" dirty="0" smtClean="0"/>
+              <a:t>="xxx"</a:t>
+            </a:r>
+            <a:endParaRPr lang="en-GB" sz="1200" i="1" dirty="0"/>
+          </a:p>
+        </p:txBody>
+      </p:sp>
+      <p:sp>
+        <p:nvSpPr>
+          <p:cNvPr id="29" name="TextBox 28"/>
+          <p:cNvSpPr txBox="1"/>
+          <p:nvPr/>
+        </p:nvSpPr>
+        <p:spPr>
+          <a:xfrm>
+            <a:off x="6660232" y="3543399"/>
+            <a:ext cx="1188787" cy="276999"/>
+          </a:xfrm>
+          <a:prstGeom prst="rect">
+            <a:avLst/>
+          </a:prstGeom>
+          <a:noFill/>
+        </p:spPr>
+        <p:txBody>
+          <a:bodyPr wrap="none" rtlCol="0">
+            <a:spAutoFit/>
+          </a:bodyPr>
+          <a:lstStyle/>
+          <a:p>
+            <a:r>
+              <a:rPr lang="en-GB" sz="1200" i="1" dirty="0" smtClean="0"/>
+              <a:t>application/</a:t>
+            </a:r>
+            <a:r>
+              <a:rPr lang="en-GB" sz="1200" i="1" dirty="0" err="1" smtClean="0"/>
+              <a:t>json</a:t>
+            </a:r>
+            <a:endParaRPr lang="en-GB" sz="1200" i="1" dirty="0"/>
+          </a:p>
+        </p:txBody>
+      </p:sp>
+      <p:sp>
+        <p:nvSpPr>
+          <p:cNvPr id="30" name="TextBox 29"/>
+          <p:cNvSpPr txBox="1"/>
+          <p:nvPr/>
+        </p:nvSpPr>
+        <p:spPr>
+          <a:xfrm>
+            <a:off x="107504" y="3554432"/>
+            <a:ext cx="3218895" cy="276999"/>
+          </a:xfrm>
+          <a:prstGeom prst="rect">
+            <a:avLst/>
+          </a:prstGeom>
+          <a:noFill/>
+        </p:spPr>
+        <p:txBody>
+          <a:bodyPr wrap="none" rtlCol="0">
+            <a:spAutoFit/>
+          </a:bodyPr>
+          <a:lstStyle/>
+          <a:p>
+            <a:r>
+              <a:rPr lang="en-GB" sz="1200" i="1" dirty="0" smtClean="0"/>
+              <a:t>application/</a:t>
+            </a:r>
+            <a:r>
+              <a:rPr lang="en-GB" sz="1200" i="1" dirty="0" err="1" smtClean="0"/>
+              <a:t>json;profile</a:t>
+            </a:r>
+            <a:r>
+              <a:rPr lang="en-GB" sz="1200" i="1" dirty="0" smtClean="0"/>
+              <a:t>=“</a:t>
+            </a:r>
+            <a:r>
+              <a:rPr lang="en-GB" sz="1200" i="1" dirty="0" err="1" smtClean="0"/>
+              <a:t>urn:org.apache.isis</a:t>
+            </a:r>
+            <a:r>
+              <a:rPr lang="en-GB" sz="1200" i="1" dirty="0" smtClean="0"/>
+              <a:t>/v1"</a:t>
+            </a:r>
+            <a:endParaRPr lang="en-GB" sz="1200" i="1" dirty="0"/>
+          </a:p>
+        </p:txBody>
+      </p:sp>
+      <p:sp>
+        <p:nvSpPr>
+          <p:cNvPr id="31" name="TextBox 30"/>
+          <p:cNvSpPr txBox="1"/>
+          <p:nvPr/>
+        </p:nvSpPr>
+        <p:spPr>
+          <a:xfrm>
+            <a:off x="3659084" y="3543399"/>
+            <a:ext cx="2684389" cy="276999"/>
+          </a:xfrm>
+          <a:prstGeom prst="rect">
+            <a:avLst/>
+          </a:prstGeom>
+          <a:noFill/>
+        </p:spPr>
+        <p:txBody>
+          <a:bodyPr wrap="none" rtlCol="0">
+            <a:spAutoFit/>
+          </a:bodyPr>
+          <a:lstStyle/>
+          <a:p>
+            <a:r>
+              <a:rPr lang="en-GB" sz="1200" i="1" dirty="0" smtClean="0"/>
+              <a:t>application/</a:t>
+            </a:r>
+            <a:r>
+              <a:rPr lang="en-GB" sz="1200" i="1" dirty="0" err="1" smtClean="0"/>
+              <a:t>xml;x-ro-domain-type</a:t>
+            </a:r>
+            <a:r>
+              <a:rPr lang="en-GB" sz="1200" i="1" dirty="0" smtClean="0"/>
+              <a:t>="xxx"</a:t>
             </a:r>
             <a:endParaRPr lang="en-GB" sz="1200" i="1" dirty="0"/>
           </a:p>

</xml_diff>